<commit_message>
Add new, Update & Delete ppts
</commit_message>
<xml_diff>
--- a/中越詩歌/耶穌給你平安_Chúa Giê-su ban bình an cho bạn.pptx
+++ b/中越詩歌/耶穌給你平安_Chúa Giê-su ban bình an cho bạn.pptx
@@ -113,6 +113,11 @@
       </a:defRPr>
     </a:lvl9pPr>
   </p:defaultTextStyle>
+  <p:extLst>
+    <p:ext uri="{EFAFB233-063F-42B5-8137-9DF3F51BA10A}">
+      <p15:sldGuideLst xmlns:p15="http://schemas.microsoft.com/office/powerpoint/2012/main"/>
+    </p:ext>
+  </p:extLst>
 </p:presentation>
 </file>
 
@@ -297,7 +302,7 @@
           <a:p>
             <a:fld id="{E4466B48-9B75-48A3-96B2-C5D953E96ADF}" type="datetimeFigureOut">
               <a:rPr lang="vi-VN" smtClean="0"/>
-              <a:t>21/12/2021</a:t>
+              <a:t>04/08/2022</a:t>
             </a:fld>
             <a:endParaRPr lang="vi-VN"/>
           </a:p>
@@ -467,7 +472,7 @@
           <a:p>
             <a:fld id="{E4466B48-9B75-48A3-96B2-C5D953E96ADF}" type="datetimeFigureOut">
               <a:rPr lang="vi-VN" smtClean="0"/>
-              <a:t>21/12/2021</a:t>
+              <a:t>04/08/2022</a:t>
             </a:fld>
             <a:endParaRPr lang="vi-VN"/>
           </a:p>
@@ -647,7 +652,7 @@
           <a:p>
             <a:fld id="{E4466B48-9B75-48A3-96B2-C5D953E96ADF}" type="datetimeFigureOut">
               <a:rPr lang="vi-VN" smtClean="0"/>
-              <a:t>21/12/2021</a:t>
+              <a:t>04/08/2022</a:t>
             </a:fld>
             <a:endParaRPr lang="vi-VN"/>
           </a:p>
@@ -817,7 +822,7 @@
           <a:p>
             <a:fld id="{E4466B48-9B75-48A3-96B2-C5D953E96ADF}" type="datetimeFigureOut">
               <a:rPr lang="vi-VN" smtClean="0"/>
-              <a:t>21/12/2021</a:t>
+              <a:t>04/08/2022</a:t>
             </a:fld>
             <a:endParaRPr lang="vi-VN"/>
           </a:p>
@@ -1063,7 +1068,7 @@
           <a:p>
             <a:fld id="{E4466B48-9B75-48A3-96B2-C5D953E96ADF}" type="datetimeFigureOut">
               <a:rPr lang="vi-VN" smtClean="0"/>
-              <a:t>21/12/2021</a:t>
+              <a:t>04/08/2022</a:t>
             </a:fld>
             <a:endParaRPr lang="vi-VN"/>
           </a:p>
@@ -1351,7 +1356,7 @@
           <a:p>
             <a:fld id="{E4466B48-9B75-48A3-96B2-C5D953E96ADF}" type="datetimeFigureOut">
               <a:rPr lang="vi-VN" smtClean="0"/>
-              <a:t>21/12/2021</a:t>
+              <a:t>04/08/2022</a:t>
             </a:fld>
             <a:endParaRPr lang="vi-VN"/>
           </a:p>
@@ -1773,7 +1778,7 @@
           <a:p>
             <a:fld id="{E4466B48-9B75-48A3-96B2-C5D953E96ADF}" type="datetimeFigureOut">
               <a:rPr lang="vi-VN" smtClean="0"/>
-              <a:t>21/12/2021</a:t>
+              <a:t>04/08/2022</a:t>
             </a:fld>
             <a:endParaRPr lang="vi-VN"/>
           </a:p>
@@ -1891,7 +1896,7 @@
           <a:p>
             <a:fld id="{E4466B48-9B75-48A3-96B2-C5D953E96ADF}" type="datetimeFigureOut">
               <a:rPr lang="vi-VN" smtClean="0"/>
-              <a:t>21/12/2021</a:t>
+              <a:t>04/08/2022</a:t>
             </a:fld>
             <a:endParaRPr lang="vi-VN"/>
           </a:p>
@@ -1986,7 +1991,7 @@
           <a:p>
             <a:fld id="{E4466B48-9B75-48A3-96B2-C5D953E96ADF}" type="datetimeFigureOut">
               <a:rPr lang="vi-VN" smtClean="0"/>
-              <a:t>21/12/2021</a:t>
+              <a:t>04/08/2022</a:t>
             </a:fld>
             <a:endParaRPr lang="vi-VN"/>
           </a:p>
@@ -2263,7 +2268,7 @@
           <a:p>
             <a:fld id="{E4466B48-9B75-48A3-96B2-C5D953E96ADF}" type="datetimeFigureOut">
               <a:rPr lang="vi-VN" smtClean="0"/>
-              <a:t>21/12/2021</a:t>
+              <a:t>04/08/2022</a:t>
             </a:fld>
             <a:endParaRPr lang="vi-VN"/>
           </a:p>
@@ -2520,7 +2525,7 @@
           <a:p>
             <a:fld id="{E4466B48-9B75-48A3-96B2-C5D953E96ADF}" type="datetimeFigureOut">
               <a:rPr lang="vi-VN" smtClean="0"/>
-              <a:t>21/12/2021</a:t>
+              <a:t>04/08/2022</a:t>
             </a:fld>
             <a:endParaRPr lang="vi-VN"/>
           </a:p>
@@ -2738,7 +2743,7 @@
           <a:p>
             <a:fld id="{E4466B48-9B75-48A3-96B2-C5D953E96ADF}" type="datetimeFigureOut">
               <a:rPr lang="vi-VN" smtClean="0"/>
-              <a:t>21/12/2021</a:t>
+              <a:t>04/08/2022</a:t>
             </a:fld>
             <a:endParaRPr lang="vi-VN"/>
           </a:p>
@@ -3780,6 +3785,84 @@
           </a:p>
         </p:txBody>
       </p:sp>
+      <p:sp>
+        <p:nvSpPr>
+          <p:cNvPr id="4" name="TextBox 3"/>
+          <p:cNvSpPr txBox="1"/>
+          <p:nvPr/>
+        </p:nvSpPr>
+        <p:spPr>
+          <a:xfrm>
+            <a:off x="0" y="5092916"/>
+            <a:ext cx="12192000" cy="646331"/>
+          </a:xfrm>
+          <a:prstGeom prst="rect">
+            <a:avLst/>
+          </a:prstGeom>
+          <a:noFill/>
+        </p:spPr>
+        <p:txBody>
+          <a:bodyPr wrap="square" rtlCol="0">
+            <a:spAutoFit/>
+          </a:bodyPr>
+          <a:lstStyle/>
+          <a:p>
+            <a:pPr algn="ctr"/>
+            <a:r>
+              <a:rPr lang="en-US" sz="3600" b="1" dirty="0">
+                <a:solidFill>
+                  <a:srgbClr val="660033"/>
+                </a:solidFill>
+                <a:effectLst/>
+                <a:latin typeface="Microsoft JhengHei" panose="020B0604030504040204" pitchFamily="34" charset="-120"/>
+                <a:ea typeface="Microsoft JhengHei" panose="020B0604030504040204" pitchFamily="34" charset="-120"/>
+              </a:rPr>
+              <a:t>( </a:t>
+            </a:r>
+            <a:r>
+              <a:rPr lang="zh-CN" altLang="en-US" sz="3600" b="1" dirty="0" smtClean="0">
+                <a:solidFill>
+                  <a:srgbClr val="660033"/>
+                </a:solidFill>
+                <a:effectLst/>
+                <a:latin typeface="Microsoft JhengHei" panose="020B0604030504040204" pitchFamily="34" charset="-120"/>
+                <a:ea typeface="Microsoft JhengHei" panose="020B0604030504040204" pitchFamily="34" charset="-120"/>
+              </a:rPr>
+              <a:t>副</a:t>
+            </a:r>
+            <a:r>
+              <a:rPr lang="en-US" sz="3600" b="1" dirty="0" smtClean="0">
+                <a:solidFill>
+                  <a:srgbClr val="660033"/>
+                </a:solidFill>
+                <a:effectLst/>
+                <a:latin typeface="Microsoft JhengHei" panose="020B0604030504040204" pitchFamily="34" charset="-120"/>
+                <a:ea typeface="Microsoft JhengHei" panose="020B0604030504040204" pitchFamily="34" charset="-120"/>
+              </a:rPr>
+              <a:t> </a:t>
+            </a:r>
+            <a:r>
+              <a:rPr lang="en-US" sz="3600" b="1" dirty="0">
+                <a:solidFill>
+                  <a:srgbClr val="660033"/>
+                </a:solidFill>
+                <a:effectLst/>
+                <a:latin typeface="Microsoft JhengHei" panose="020B0604030504040204" pitchFamily="34" charset="-120"/>
+                <a:ea typeface="Microsoft JhengHei" panose="020B0604030504040204" pitchFamily="34" charset="-120"/>
+              </a:rPr>
+              <a:t>)</a:t>
+            </a:r>
+            <a:endParaRPr lang="vi-VN" sz="3600" b="1" dirty="0">
+              <a:solidFill>
+                <a:srgbClr val="660033"/>
+              </a:solidFill>
+              <a:effectLst/>
+              <a:latin typeface="Microsoft JhengHei" panose="020B0604030504040204" pitchFamily="34" charset="-120"/>
+              <a:ea typeface="Microsoft JhengHei" panose="020B0604030504040204" pitchFamily="34" charset="-120"/>
+            </a:endParaRPr>
+          </a:p>
+        </p:txBody>
+      </p:sp>
     </p:spTree>
     <p:extLst>
       <p:ext uri="{BB962C8B-B14F-4D97-AF65-F5344CB8AC3E}">
@@ -4181,6 +4264,84 @@
           </a:p>
         </p:txBody>
       </p:sp>
+      <p:sp>
+        <p:nvSpPr>
+          <p:cNvPr id="4" name="TextBox 3"/>
+          <p:cNvSpPr txBox="1"/>
+          <p:nvPr/>
+        </p:nvSpPr>
+        <p:spPr>
+          <a:xfrm>
+            <a:off x="0" y="5092916"/>
+            <a:ext cx="12192000" cy="646331"/>
+          </a:xfrm>
+          <a:prstGeom prst="rect">
+            <a:avLst/>
+          </a:prstGeom>
+          <a:noFill/>
+        </p:spPr>
+        <p:txBody>
+          <a:bodyPr wrap="square" rtlCol="0">
+            <a:spAutoFit/>
+          </a:bodyPr>
+          <a:lstStyle/>
+          <a:p>
+            <a:pPr algn="ctr"/>
+            <a:r>
+              <a:rPr lang="en-US" sz="3600" b="1" dirty="0">
+                <a:solidFill>
+                  <a:srgbClr val="660033"/>
+                </a:solidFill>
+                <a:effectLst/>
+                <a:latin typeface="Microsoft JhengHei" panose="020B0604030504040204" pitchFamily="34" charset="-120"/>
+                <a:ea typeface="Microsoft JhengHei" panose="020B0604030504040204" pitchFamily="34" charset="-120"/>
+              </a:rPr>
+              <a:t>( </a:t>
+            </a:r>
+            <a:r>
+              <a:rPr lang="zh-CN" altLang="en-US" sz="3600" b="1" dirty="0" smtClean="0">
+                <a:solidFill>
+                  <a:srgbClr val="660033"/>
+                </a:solidFill>
+                <a:effectLst/>
+                <a:latin typeface="Microsoft JhengHei" panose="020B0604030504040204" pitchFamily="34" charset="-120"/>
+                <a:ea typeface="Microsoft JhengHei" panose="020B0604030504040204" pitchFamily="34" charset="-120"/>
+              </a:rPr>
+              <a:t>正</a:t>
+            </a:r>
+            <a:r>
+              <a:rPr lang="en-US" sz="3600" b="1" dirty="0" smtClean="0">
+                <a:solidFill>
+                  <a:srgbClr val="660033"/>
+                </a:solidFill>
+                <a:effectLst/>
+                <a:latin typeface="Microsoft JhengHei" panose="020B0604030504040204" pitchFamily="34" charset="-120"/>
+                <a:ea typeface="Microsoft JhengHei" panose="020B0604030504040204" pitchFamily="34" charset="-120"/>
+              </a:rPr>
+              <a:t> </a:t>
+            </a:r>
+            <a:r>
+              <a:rPr lang="en-US" sz="3600" b="1" dirty="0">
+                <a:solidFill>
+                  <a:srgbClr val="660033"/>
+                </a:solidFill>
+                <a:effectLst/>
+                <a:latin typeface="Microsoft JhengHei" panose="020B0604030504040204" pitchFamily="34" charset="-120"/>
+                <a:ea typeface="Microsoft JhengHei" panose="020B0604030504040204" pitchFamily="34" charset="-120"/>
+              </a:rPr>
+              <a:t>)</a:t>
+            </a:r>
+            <a:endParaRPr lang="vi-VN" sz="3600" b="1" dirty="0">
+              <a:solidFill>
+                <a:srgbClr val="660033"/>
+              </a:solidFill>
+              <a:effectLst/>
+              <a:latin typeface="Microsoft JhengHei" panose="020B0604030504040204" pitchFamily="34" charset="-120"/>
+              <a:ea typeface="Microsoft JhengHei" panose="020B0604030504040204" pitchFamily="34" charset="-120"/>
+            </a:endParaRPr>
+          </a:p>
+        </p:txBody>
+      </p:sp>
     </p:spTree>
     <p:extLst>
       <p:ext uri="{BB962C8B-B14F-4D97-AF65-F5344CB8AC3E}">
@@ -4427,18 +4588,7 @@
                 <a:ea typeface="微軟正黑體" pitchFamily="34" charset="-120"/>
                 <a:cs typeface="Calibri" panose="020F0502020204030204" pitchFamily="34" charset="0"/>
               </a:rPr>
-              <a:t>N</a:t>
-            </a:r>
-            <a:r>
-              <a:rPr lang="en-US" sz="4000" b="1" dirty="0" err="1">
-                <a:solidFill>
-                  <a:srgbClr val="000066"/>
-                </a:solidFill>
-                <a:latin typeface="Calibri" panose="020F0502020204030204" pitchFamily="34" charset="0"/>
-                <a:ea typeface="微軟正黑體" pitchFamily="34" charset="-120"/>
-                <a:cs typeface="Calibri" panose="020F0502020204030204" pitchFamily="34" charset="0"/>
-              </a:rPr>
-              <a:t>hưng</a:t>
+              <a:t>Nhưng</a:t>
             </a:r>
             <a:r>
               <a:rPr lang="en-US" sz="4000" b="1" dirty="0">
@@ -4579,6 +4729,84 @@
               <a:latin typeface="Calibri" panose="020F0502020204030204" pitchFamily="34" charset="0"/>
               <a:ea typeface="微軟正黑體" pitchFamily="34" charset="-120"/>
               <a:cs typeface="Calibri" panose="020F0502020204030204" pitchFamily="34" charset="0"/>
+            </a:endParaRPr>
+          </a:p>
+        </p:txBody>
+      </p:sp>
+      <p:sp>
+        <p:nvSpPr>
+          <p:cNvPr id="4" name="TextBox 3"/>
+          <p:cNvSpPr txBox="1"/>
+          <p:nvPr/>
+        </p:nvSpPr>
+        <p:spPr>
+          <a:xfrm>
+            <a:off x="0" y="5092916"/>
+            <a:ext cx="12192000" cy="646331"/>
+          </a:xfrm>
+          <a:prstGeom prst="rect">
+            <a:avLst/>
+          </a:prstGeom>
+          <a:noFill/>
+        </p:spPr>
+        <p:txBody>
+          <a:bodyPr wrap="square" rtlCol="0">
+            <a:spAutoFit/>
+          </a:bodyPr>
+          <a:lstStyle/>
+          <a:p>
+            <a:pPr algn="ctr"/>
+            <a:r>
+              <a:rPr lang="en-US" sz="3600" b="1" dirty="0">
+                <a:solidFill>
+                  <a:srgbClr val="660033"/>
+                </a:solidFill>
+                <a:effectLst/>
+                <a:latin typeface="Microsoft JhengHei" panose="020B0604030504040204" pitchFamily="34" charset="-120"/>
+                <a:ea typeface="Microsoft JhengHei" panose="020B0604030504040204" pitchFamily="34" charset="-120"/>
+              </a:rPr>
+              <a:t>( </a:t>
+            </a:r>
+            <a:r>
+              <a:rPr lang="zh-CN" altLang="en-US" sz="3600" b="1" dirty="0" smtClean="0">
+                <a:solidFill>
+                  <a:srgbClr val="660033"/>
+                </a:solidFill>
+                <a:effectLst/>
+                <a:latin typeface="Microsoft JhengHei" panose="020B0604030504040204" pitchFamily="34" charset="-120"/>
+                <a:ea typeface="Microsoft JhengHei" panose="020B0604030504040204" pitchFamily="34" charset="-120"/>
+              </a:rPr>
+              <a:t>正</a:t>
+            </a:r>
+            <a:r>
+              <a:rPr lang="en-US" sz="3600" b="1" dirty="0" smtClean="0">
+                <a:solidFill>
+                  <a:srgbClr val="660033"/>
+                </a:solidFill>
+                <a:effectLst/>
+                <a:latin typeface="Microsoft JhengHei" panose="020B0604030504040204" pitchFamily="34" charset="-120"/>
+                <a:ea typeface="Microsoft JhengHei" panose="020B0604030504040204" pitchFamily="34" charset="-120"/>
+              </a:rPr>
+              <a:t> </a:t>
+            </a:r>
+            <a:r>
+              <a:rPr lang="en-US" sz="3600" b="1" dirty="0">
+                <a:solidFill>
+                  <a:srgbClr val="660033"/>
+                </a:solidFill>
+                <a:effectLst/>
+                <a:latin typeface="Microsoft JhengHei" panose="020B0604030504040204" pitchFamily="34" charset="-120"/>
+                <a:ea typeface="Microsoft JhengHei" panose="020B0604030504040204" pitchFamily="34" charset="-120"/>
+              </a:rPr>
+              <a:t>)</a:t>
+            </a:r>
+            <a:endParaRPr lang="vi-VN" sz="3600" b="1" dirty="0">
+              <a:solidFill>
+                <a:srgbClr val="660033"/>
+              </a:solidFill>
+              <a:effectLst/>
+              <a:latin typeface="Microsoft JhengHei" panose="020B0604030504040204" pitchFamily="34" charset="-120"/>
+              <a:ea typeface="Microsoft JhengHei" panose="020B0604030504040204" pitchFamily="34" charset="-120"/>
             </a:endParaRPr>
           </a:p>
         </p:txBody>
@@ -4975,6 +5203,84 @@
           </a:p>
         </p:txBody>
       </p:sp>
+      <p:sp>
+        <p:nvSpPr>
+          <p:cNvPr id="4" name="TextBox 3"/>
+          <p:cNvSpPr txBox="1"/>
+          <p:nvPr/>
+        </p:nvSpPr>
+        <p:spPr>
+          <a:xfrm>
+            <a:off x="0" y="5092916"/>
+            <a:ext cx="12192000" cy="646331"/>
+          </a:xfrm>
+          <a:prstGeom prst="rect">
+            <a:avLst/>
+          </a:prstGeom>
+          <a:noFill/>
+        </p:spPr>
+        <p:txBody>
+          <a:bodyPr wrap="square" rtlCol="0">
+            <a:spAutoFit/>
+          </a:bodyPr>
+          <a:lstStyle/>
+          <a:p>
+            <a:pPr algn="ctr"/>
+            <a:r>
+              <a:rPr lang="en-US" sz="3600" b="1" dirty="0">
+                <a:solidFill>
+                  <a:srgbClr val="660033"/>
+                </a:solidFill>
+                <a:effectLst/>
+                <a:latin typeface="Microsoft JhengHei" panose="020B0604030504040204" pitchFamily="34" charset="-120"/>
+                <a:ea typeface="Microsoft JhengHei" panose="020B0604030504040204" pitchFamily="34" charset="-120"/>
+              </a:rPr>
+              <a:t>( </a:t>
+            </a:r>
+            <a:r>
+              <a:rPr lang="zh-CN" altLang="en-US" sz="3600" b="1" dirty="0" smtClean="0">
+                <a:solidFill>
+                  <a:srgbClr val="660033"/>
+                </a:solidFill>
+                <a:effectLst/>
+                <a:latin typeface="Microsoft JhengHei" panose="020B0604030504040204" pitchFamily="34" charset="-120"/>
+                <a:ea typeface="Microsoft JhengHei" panose="020B0604030504040204" pitchFamily="34" charset="-120"/>
+              </a:rPr>
+              <a:t>正</a:t>
+            </a:r>
+            <a:r>
+              <a:rPr lang="en-US" sz="3600" b="1" dirty="0" smtClean="0">
+                <a:solidFill>
+                  <a:srgbClr val="660033"/>
+                </a:solidFill>
+                <a:effectLst/>
+                <a:latin typeface="Microsoft JhengHei" panose="020B0604030504040204" pitchFamily="34" charset="-120"/>
+                <a:ea typeface="Microsoft JhengHei" panose="020B0604030504040204" pitchFamily="34" charset="-120"/>
+              </a:rPr>
+              <a:t> </a:t>
+            </a:r>
+            <a:r>
+              <a:rPr lang="en-US" sz="3600" b="1" dirty="0">
+                <a:solidFill>
+                  <a:srgbClr val="660033"/>
+                </a:solidFill>
+                <a:effectLst/>
+                <a:latin typeface="Microsoft JhengHei" panose="020B0604030504040204" pitchFamily="34" charset="-120"/>
+                <a:ea typeface="Microsoft JhengHei" panose="020B0604030504040204" pitchFamily="34" charset="-120"/>
+              </a:rPr>
+              <a:t>)</a:t>
+            </a:r>
+            <a:endParaRPr lang="vi-VN" sz="3600" b="1" dirty="0">
+              <a:solidFill>
+                <a:srgbClr val="660033"/>
+              </a:solidFill>
+              <a:effectLst/>
+              <a:latin typeface="Microsoft JhengHei" panose="020B0604030504040204" pitchFamily="34" charset="-120"/>
+              <a:ea typeface="Microsoft JhengHei" panose="020B0604030504040204" pitchFamily="34" charset="-120"/>
+            </a:endParaRPr>
+          </a:p>
+        </p:txBody>
+      </p:sp>
     </p:spTree>
     <p:extLst>
       <p:ext uri="{BB962C8B-B14F-4D97-AF65-F5344CB8AC3E}">
@@ -5347,6 +5653,84 @@
           </a:p>
         </p:txBody>
       </p:sp>
+      <p:sp>
+        <p:nvSpPr>
+          <p:cNvPr id="4" name="TextBox 3"/>
+          <p:cNvSpPr txBox="1"/>
+          <p:nvPr/>
+        </p:nvSpPr>
+        <p:spPr>
+          <a:xfrm>
+            <a:off x="0" y="5092916"/>
+            <a:ext cx="12192000" cy="646331"/>
+          </a:xfrm>
+          <a:prstGeom prst="rect">
+            <a:avLst/>
+          </a:prstGeom>
+          <a:noFill/>
+        </p:spPr>
+        <p:txBody>
+          <a:bodyPr wrap="square" rtlCol="0">
+            <a:spAutoFit/>
+          </a:bodyPr>
+          <a:lstStyle/>
+          <a:p>
+            <a:pPr algn="ctr"/>
+            <a:r>
+              <a:rPr lang="en-US" sz="3600" b="1" dirty="0">
+                <a:solidFill>
+                  <a:srgbClr val="660033"/>
+                </a:solidFill>
+                <a:effectLst/>
+                <a:latin typeface="Microsoft JhengHei" panose="020B0604030504040204" pitchFamily="34" charset="-120"/>
+                <a:ea typeface="Microsoft JhengHei" panose="020B0604030504040204" pitchFamily="34" charset="-120"/>
+              </a:rPr>
+              <a:t>( </a:t>
+            </a:r>
+            <a:r>
+              <a:rPr lang="zh-CN" altLang="en-US" sz="3600" b="1" dirty="0" smtClean="0">
+                <a:solidFill>
+                  <a:srgbClr val="660033"/>
+                </a:solidFill>
+                <a:effectLst/>
+                <a:latin typeface="Microsoft JhengHei" panose="020B0604030504040204" pitchFamily="34" charset="-120"/>
+                <a:ea typeface="Microsoft JhengHei" panose="020B0604030504040204" pitchFamily="34" charset="-120"/>
+              </a:rPr>
+              <a:t>正</a:t>
+            </a:r>
+            <a:r>
+              <a:rPr lang="en-US" sz="3600" b="1" dirty="0" smtClean="0">
+                <a:solidFill>
+                  <a:srgbClr val="660033"/>
+                </a:solidFill>
+                <a:effectLst/>
+                <a:latin typeface="Microsoft JhengHei" panose="020B0604030504040204" pitchFamily="34" charset="-120"/>
+                <a:ea typeface="Microsoft JhengHei" panose="020B0604030504040204" pitchFamily="34" charset="-120"/>
+              </a:rPr>
+              <a:t> </a:t>
+            </a:r>
+            <a:r>
+              <a:rPr lang="en-US" sz="3600" b="1" dirty="0">
+                <a:solidFill>
+                  <a:srgbClr val="660033"/>
+                </a:solidFill>
+                <a:effectLst/>
+                <a:latin typeface="Microsoft JhengHei" panose="020B0604030504040204" pitchFamily="34" charset="-120"/>
+                <a:ea typeface="Microsoft JhengHei" panose="020B0604030504040204" pitchFamily="34" charset="-120"/>
+              </a:rPr>
+              <a:t>)</a:t>
+            </a:r>
+            <a:endParaRPr lang="vi-VN" sz="3600" b="1" dirty="0">
+              <a:solidFill>
+                <a:srgbClr val="660033"/>
+              </a:solidFill>
+              <a:effectLst/>
+              <a:latin typeface="Microsoft JhengHei" panose="020B0604030504040204" pitchFamily="34" charset="-120"/>
+              <a:ea typeface="Microsoft JhengHei" panose="020B0604030504040204" pitchFamily="34" charset="-120"/>
+            </a:endParaRPr>
+          </a:p>
+        </p:txBody>
+      </p:sp>
     </p:spTree>
     <p:extLst>
       <p:ext uri="{BB962C8B-B14F-4D97-AF65-F5344CB8AC3E}">
@@ -5761,6 +6145,84 @@
           </a:p>
         </p:txBody>
       </p:sp>
+      <p:sp>
+        <p:nvSpPr>
+          <p:cNvPr id="4" name="TextBox 3"/>
+          <p:cNvSpPr txBox="1"/>
+          <p:nvPr/>
+        </p:nvSpPr>
+        <p:spPr>
+          <a:xfrm>
+            <a:off x="0" y="5092916"/>
+            <a:ext cx="12192000" cy="646331"/>
+          </a:xfrm>
+          <a:prstGeom prst="rect">
+            <a:avLst/>
+          </a:prstGeom>
+          <a:noFill/>
+        </p:spPr>
+        <p:txBody>
+          <a:bodyPr wrap="square" rtlCol="0">
+            <a:spAutoFit/>
+          </a:bodyPr>
+          <a:lstStyle/>
+          <a:p>
+            <a:pPr algn="ctr"/>
+            <a:r>
+              <a:rPr lang="en-US" sz="3600" b="1" dirty="0">
+                <a:solidFill>
+                  <a:srgbClr val="660033"/>
+                </a:solidFill>
+                <a:effectLst/>
+                <a:latin typeface="Microsoft JhengHei" panose="020B0604030504040204" pitchFamily="34" charset="-120"/>
+                <a:ea typeface="Microsoft JhengHei" panose="020B0604030504040204" pitchFamily="34" charset="-120"/>
+              </a:rPr>
+              <a:t>( </a:t>
+            </a:r>
+            <a:r>
+              <a:rPr lang="zh-CN" altLang="en-US" sz="3600" b="1" dirty="0" smtClean="0">
+                <a:solidFill>
+                  <a:srgbClr val="660033"/>
+                </a:solidFill>
+                <a:effectLst/>
+                <a:latin typeface="Microsoft JhengHei" panose="020B0604030504040204" pitchFamily="34" charset="-120"/>
+                <a:ea typeface="Microsoft JhengHei" panose="020B0604030504040204" pitchFamily="34" charset="-120"/>
+              </a:rPr>
+              <a:t>副</a:t>
+            </a:r>
+            <a:r>
+              <a:rPr lang="en-US" sz="3600" b="1" dirty="0" smtClean="0">
+                <a:solidFill>
+                  <a:srgbClr val="660033"/>
+                </a:solidFill>
+                <a:effectLst/>
+                <a:latin typeface="Microsoft JhengHei" panose="020B0604030504040204" pitchFamily="34" charset="-120"/>
+                <a:ea typeface="Microsoft JhengHei" panose="020B0604030504040204" pitchFamily="34" charset="-120"/>
+              </a:rPr>
+              <a:t> </a:t>
+            </a:r>
+            <a:r>
+              <a:rPr lang="en-US" sz="3600" b="1" dirty="0">
+                <a:solidFill>
+                  <a:srgbClr val="660033"/>
+                </a:solidFill>
+                <a:effectLst/>
+                <a:latin typeface="Microsoft JhengHei" panose="020B0604030504040204" pitchFamily="34" charset="-120"/>
+                <a:ea typeface="Microsoft JhengHei" panose="020B0604030504040204" pitchFamily="34" charset="-120"/>
+              </a:rPr>
+              <a:t>)</a:t>
+            </a:r>
+            <a:endParaRPr lang="vi-VN" sz="3600" b="1" dirty="0">
+              <a:solidFill>
+                <a:srgbClr val="660033"/>
+              </a:solidFill>
+              <a:effectLst/>
+              <a:latin typeface="Microsoft JhengHei" panose="020B0604030504040204" pitchFamily="34" charset="-120"/>
+              <a:ea typeface="Microsoft JhengHei" panose="020B0604030504040204" pitchFamily="34" charset="-120"/>
+            </a:endParaRPr>
+          </a:p>
+        </p:txBody>
+      </p:sp>
     </p:spTree>
     <p:extLst>
       <p:ext uri="{BB962C8B-B14F-4D97-AF65-F5344CB8AC3E}">
@@ -6174,6 +6636,84 @@
           </a:p>
         </p:txBody>
       </p:sp>
+      <p:sp>
+        <p:nvSpPr>
+          <p:cNvPr id="4" name="TextBox 3"/>
+          <p:cNvSpPr txBox="1"/>
+          <p:nvPr/>
+        </p:nvSpPr>
+        <p:spPr>
+          <a:xfrm>
+            <a:off x="0" y="5092916"/>
+            <a:ext cx="12192000" cy="646331"/>
+          </a:xfrm>
+          <a:prstGeom prst="rect">
+            <a:avLst/>
+          </a:prstGeom>
+          <a:noFill/>
+        </p:spPr>
+        <p:txBody>
+          <a:bodyPr wrap="square" rtlCol="0">
+            <a:spAutoFit/>
+          </a:bodyPr>
+          <a:lstStyle/>
+          <a:p>
+            <a:pPr algn="ctr"/>
+            <a:r>
+              <a:rPr lang="en-US" sz="3600" b="1" dirty="0">
+                <a:solidFill>
+                  <a:srgbClr val="660033"/>
+                </a:solidFill>
+                <a:effectLst/>
+                <a:latin typeface="Microsoft JhengHei" panose="020B0604030504040204" pitchFamily="34" charset="-120"/>
+                <a:ea typeface="Microsoft JhengHei" panose="020B0604030504040204" pitchFamily="34" charset="-120"/>
+              </a:rPr>
+              <a:t>( </a:t>
+            </a:r>
+            <a:r>
+              <a:rPr lang="zh-CN" altLang="en-US" sz="3600" b="1" dirty="0" smtClean="0">
+                <a:solidFill>
+                  <a:srgbClr val="660033"/>
+                </a:solidFill>
+                <a:effectLst/>
+                <a:latin typeface="Microsoft JhengHei" panose="020B0604030504040204" pitchFamily="34" charset="-120"/>
+                <a:ea typeface="Microsoft JhengHei" panose="020B0604030504040204" pitchFamily="34" charset="-120"/>
+              </a:rPr>
+              <a:t>副</a:t>
+            </a:r>
+            <a:r>
+              <a:rPr lang="en-US" sz="3600" b="1" dirty="0" smtClean="0">
+                <a:solidFill>
+                  <a:srgbClr val="660033"/>
+                </a:solidFill>
+                <a:effectLst/>
+                <a:latin typeface="Microsoft JhengHei" panose="020B0604030504040204" pitchFamily="34" charset="-120"/>
+                <a:ea typeface="Microsoft JhengHei" panose="020B0604030504040204" pitchFamily="34" charset="-120"/>
+              </a:rPr>
+              <a:t> </a:t>
+            </a:r>
+            <a:r>
+              <a:rPr lang="en-US" sz="3600" b="1" dirty="0">
+                <a:solidFill>
+                  <a:srgbClr val="660033"/>
+                </a:solidFill>
+                <a:effectLst/>
+                <a:latin typeface="Microsoft JhengHei" panose="020B0604030504040204" pitchFamily="34" charset="-120"/>
+                <a:ea typeface="Microsoft JhengHei" panose="020B0604030504040204" pitchFamily="34" charset="-120"/>
+              </a:rPr>
+              <a:t>)</a:t>
+            </a:r>
+            <a:endParaRPr lang="vi-VN" sz="3600" b="1" dirty="0">
+              <a:solidFill>
+                <a:srgbClr val="660033"/>
+              </a:solidFill>
+              <a:effectLst/>
+              <a:latin typeface="Microsoft JhengHei" panose="020B0604030504040204" pitchFamily="34" charset="-120"/>
+              <a:ea typeface="Microsoft JhengHei" panose="020B0604030504040204" pitchFamily="34" charset="-120"/>
+            </a:endParaRPr>
+          </a:p>
+        </p:txBody>
+      </p:sp>
     </p:spTree>
     <p:extLst>
       <p:ext uri="{BB962C8B-B14F-4D97-AF65-F5344CB8AC3E}">
@@ -6502,6 +7042,84 @@
           </a:p>
         </p:txBody>
       </p:sp>
+      <p:sp>
+        <p:nvSpPr>
+          <p:cNvPr id="4" name="TextBox 3"/>
+          <p:cNvSpPr txBox="1"/>
+          <p:nvPr/>
+        </p:nvSpPr>
+        <p:spPr>
+          <a:xfrm>
+            <a:off x="0" y="5092916"/>
+            <a:ext cx="12192000" cy="646331"/>
+          </a:xfrm>
+          <a:prstGeom prst="rect">
+            <a:avLst/>
+          </a:prstGeom>
+          <a:noFill/>
+        </p:spPr>
+        <p:txBody>
+          <a:bodyPr wrap="square" rtlCol="0">
+            <a:spAutoFit/>
+          </a:bodyPr>
+          <a:lstStyle/>
+          <a:p>
+            <a:pPr algn="ctr"/>
+            <a:r>
+              <a:rPr lang="en-US" sz="3600" b="1" dirty="0">
+                <a:solidFill>
+                  <a:srgbClr val="660033"/>
+                </a:solidFill>
+                <a:effectLst/>
+                <a:latin typeface="Microsoft JhengHei" panose="020B0604030504040204" pitchFamily="34" charset="-120"/>
+                <a:ea typeface="Microsoft JhengHei" panose="020B0604030504040204" pitchFamily="34" charset="-120"/>
+              </a:rPr>
+              <a:t>( </a:t>
+            </a:r>
+            <a:r>
+              <a:rPr lang="zh-CN" altLang="en-US" sz="3600" b="1" dirty="0" smtClean="0">
+                <a:solidFill>
+                  <a:srgbClr val="660033"/>
+                </a:solidFill>
+                <a:effectLst/>
+                <a:latin typeface="Microsoft JhengHei" panose="020B0604030504040204" pitchFamily="34" charset="-120"/>
+                <a:ea typeface="Microsoft JhengHei" panose="020B0604030504040204" pitchFamily="34" charset="-120"/>
+              </a:rPr>
+              <a:t>副</a:t>
+            </a:r>
+            <a:r>
+              <a:rPr lang="en-US" sz="3600" b="1" dirty="0" smtClean="0">
+                <a:solidFill>
+                  <a:srgbClr val="660033"/>
+                </a:solidFill>
+                <a:effectLst/>
+                <a:latin typeface="Microsoft JhengHei" panose="020B0604030504040204" pitchFamily="34" charset="-120"/>
+                <a:ea typeface="Microsoft JhengHei" panose="020B0604030504040204" pitchFamily="34" charset="-120"/>
+              </a:rPr>
+              <a:t> </a:t>
+            </a:r>
+            <a:r>
+              <a:rPr lang="en-US" sz="3600" b="1" dirty="0">
+                <a:solidFill>
+                  <a:srgbClr val="660033"/>
+                </a:solidFill>
+                <a:effectLst/>
+                <a:latin typeface="Microsoft JhengHei" panose="020B0604030504040204" pitchFamily="34" charset="-120"/>
+                <a:ea typeface="Microsoft JhengHei" panose="020B0604030504040204" pitchFamily="34" charset="-120"/>
+              </a:rPr>
+              <a:t>)</a:t>
+            </a:r>
+            <a:endParaRPr lang="vi-VN" sz="3600" b="1" dirty="0">
+              <a:solidFill>
+                <a:srgbClr val="660033"/>
+              </a:solidFill>
+              <a:effectLst/>
+              <a:latin typeface="Microsoft JhengHei" panose="020B0604030504040204" pitchFamily="34" charset="-120"/>
+              <a:ea typeface="Microsoft JhengHei" panose="020B0604030504040204" pitchFamily="34" charset="-120"/>
+            </a:endParaRPr>
+          </a:p>
+        </p:txBody>
+      </p:sp>
     </p:spTree>
     <p:extLst>
       <p:ext uri="{BB962C8B-B14F-4D97-AF65-F5344CB8AC3E}">
@@ -6915,6 +7533,84 @@
               </a:rPr>
               <a:t> an</a:t>
             </a:r>
+          </a:p>
+        </p:txBody>
+      </p:sp>
+      <p:sp>
+        <p:nvSpPr>
+          <p:cNvPr id="4" name="TextBox 3"/>
+          <p:cNvSpPr txBox="1"/>
+          <p:nvPr/>
+        </p:nvSpPr>
+        <p:spPr>
+          <a:xfrm>
+            <a:off x="0" y="5092916"/>
+            <a:ext cx="12192000" cy="646331"/>
+          </a:xfrm>
+          <a:prstGeom prst="rect">
+            <a:avLst/>
+          </a:prstGeom>
+          <a:noFill/>
+        </p:spPr>
+        <p:txBody>
+          <a:bodyPr wrap="square" rtlCol="0">
+            <a:spAutoFit/>
+          </a:bodyPr>
+          <a:lstStyle/>
+          <a:p>
+            <a:pPr algn="ctr"/>
+            <a:r>
+              <a:rPr lang="en-US" sz="3600" b="1" dirty="0">
+                <a:solidFill>
+                  <a:srgbClr val="660033"/>
+                </a:solidFill>
+                <a:effectLst/>
+                <a:latin typeface="Microsoft JhengHei" panose="020B0604030504040204" pitchFamily="34" charset="-120"/>
+                <a:ea typeface="Microsoft JhengHei" panose="020B0604030504040204" pitchFamily="34" charset="-120"/>
+              </a:rPr>
+              <a:t>( </a:t>
+            </a:r>
+            <a:r>
+              <a:rPr lang="zh-CN" altLang="en-US" sz="3600" b="1" dirty="0" smtClean="0">
+                <a:solidFill>
+                  <a:srgbClr val="660033"/>
+                </a:solidFill>
+                <a:effectLst/>
+                <a:latin typeface="Microsoft JhengHei" panose="020B0604030504040204" pitchFamily="34" charset="-120"/>
+                <a:ea typeface="Microsoft JhengHei" panose="020B0604030504040204" pitchFamily="34" charset="-120"/>
+              </a:rPr>
+              <a:t>副</a:t>
+            </a:r>
+            <a:r>
+              <a:rPr lang="en-US" sz="3600" b="1" dirty="0" smtClean="0">
+                <a:solidFill>
+                  <a:srgbClr val="660033"/>
+                </a:solidFill>
+                <a:effectLst/>
+                <a:latin typeface="Microsoft JhengHei" panose="020B0604030504040204" pitchFamily="34" charset="-120"/>
+                <a:ea typeface="Microsoft JhengHei" panose="020B0604030504040204" pitchFamily="34" charset="-120"/>
+              </a:rPr>
+              <a:t> </a:t>
+            </a:r>
+            <a:r>
+              <a:rPr lang="en-US" sz="3600" b="1" dirty="0">
+                <a:solidFill>
+                  <a:srgbClr val="660033"/>
+                </a:solidFill>
+                <a:effectLst/>
+                <a:latin typeface="Microsoft JhengHei" panose="020B0604030504040204" pitchFamily="34" charset="-120"/>
+                <a:ea typeface="Microsoft JhengHei" panose="020B0604030504040204" pitchFamily="34" charset="-120"/>
+              </a:rPr>
+              <a:t>)</a:t>
+            </a:r>
+            <a:endParaRPr lang="vi-VN" sz="3600" b="1" dirty="0">
+              <a:solidFill>
+                <a:srgbClr val="660033"/>
+              </a:solidFill>
+              <a:effectLst/>
+              <a:latin typeface="Microsoft JhengHei" panose="020B0604030504040204" pitchFamily="34" charset="-120"/>
+              <a:ea typeface="Microsoft JhengHei" panose="020B0604030504040204" pitchFamily="34" charset="-120"/>
+            </a:endParaRPr>
           </a:p>
         </p:txBody>
       </p:sp>

</xml_diff>